<commit_message>
guess i made some changes
</commit_message>
<xml_diff>
--- a/lecture19v1.pptx
+++ b/lecture19v1.pptx
@@ -249,7 +249,7 @@
           <a:p>
             <a:fld id="{EA8D3418-03AE-E04E-8436-3042FFD692E6}" type="datetimeFigureOut">
               <a:rPr lang="en-US" smtClean="0"/>
-              <a:t>11/7/17</a:t>
+              <a:t>12/5/17</a:t>
             </a:fld>
             <a:endParaRPr lang="en-US"/>
           </a:p>
@@ -648,7 +648,7 @@
           <a:p>
             <a:fld id="{B122C9D4-D70C-8744-B8EA-410692182F3A}" type="datetimeFigureOut">
               <a:rPr lang="en-US" smtClean="0"/>
-              <a:t>11/7/17</a:t>
+              <a:t>12/5/17</a:t>
             </a:fld>
             <a:endParaRPr lang="en-US"/>
           </a:p>
@@ -818,7 +818,7 @@
           <a:p>
             <a:fld id="{B122C9D4-D70C-8744-B8EA-410692182F3A}" type="datetimeFigureOut">
               <a:rPr lang="en-US" smtClean="0"/>
-              <a:t>11/7/17</a:t>
+              <a:t>12/5/17</a:t>
             </a:fld>
             <a:endParaRPr lang="en-US"/>
           </a:p>
@@ -998,7 +998,7 @@
           <a:p>
             <a:fld id="{B122C9D4-D70C-8744-B8EA-410692182F3A}" type="datetimeFigureOut">
               <a:rPr lang="en-US" smtClean="0"/>
-              <a:t>11/7/17</a:t>
+              <a:t>12/5/17</a:t>
             </a:fld>
             <a:endParaRPr lang="en-US"/>
           </a:p>
@@ -1168,7 +1168,7 @@
           <a:p>
             <a:fld id="{B122C9D4-D70C-8744-B8EA-410692182F3A}" type="datetimeFigureOut">
               <a:rPr lang="en-US" smtClean="0"/>
-              <a:t>11/7/17</a:t>
+              <a:t>12/5/17</a:t>
             </a:fld>
             <a:endParaRPr lang="en-US"/>
           </a:p>
@@ -1414,7 +1414,7 @@
           <a:p>
             <a:fld id="{B122C9D4-D70C-8744-B8EA-410692182F3A}" type="datetimeFigureOut">
               <a:rPr lang="en-US" smtClean="0"/>
-              <a:t>11/7/17</a:t>
+              <a:t>12/5/17</a:t>
             </a:fld>
             <a:endParaRPr lang="en-US"/>
           </a:p>
@@ -1646,7 +1646,7 @@
           <a:p>
             <a:fld id="{B122C9D4-D70C-8744-B8EA-410692182F3A}" type="datetimeFigureOut">
               <a:rPr lang="en-US" smtClean="0"/>
-              <a:t>11/7/17</a:t>
+              <a:t>12/5/17</a:t>
             </a:fld>
             <a:endParaRPr lang="en-US"/>
           </a:p>
@@ -2013,7 +2013,7 @@
           <a:p>
             <a:fld id="{B122C9D4-D70C-8744-B8EA-410692182F3A}" type="datetimeFigureOut">
               <a:rPr lang="en-US" smtClean="0"/>
-              <a:t>11/7/17</a:t>
+              <a:t>12/5/17</a:t>
             </a:fld>
             <a:endParaRPr lang="en-US"/>
           </a:p>
@@ -2131,7 +2131,7 @@
           <a:p>
             <a:fld id="{B122C9D4-D70C-8744-B8EA-410692182F3A}" type="datetimeFigureOut">
               <a:rPr lang="en-US" smtClean="0"/>
-              <a:t>11/7/17</a:t>
+              <a:t>12/5/17</a:t>
             </a:fld>
             <a:endParaRPr lang="en-US"/>
           </a:p>
@@ -2226,7 +2226,7 @@
           <a:p>
             <a:fld id="{B122C9D4-D70C-8744-B8EA-410692182F3A}" type="datetimeFigureOut">
               <a:rPr lang="en-US" smtClean="0"/>
-              <a:t>11/7/17</a:t>
+              <a:t>12/5/17</a:t>
             </a:fld>
             <a:endParaRPr lang="en-US"/>
           </a:p>
@@ -2503,7 +2503,7 @@
           <a:p>
             <a:fld id="{B122C9D4-D70C-8744-B8EA-410692182F3A}" type="datetimeFigureOut">
               <a:rPr lang="en-US" smtClean="0"/>
-              <a:t>11/7/17</a:t>
+              <a:t>12/5/17</a:t>
             </a:fld>
             <a:endParaRPr lang="en-US"/>
           </a:p>
@@ -2756,7 +2756,7 @@
           <a:p>
             <a:fld id="{B122C9D4-D70C-8744-B8EA-410692182F3A}" type="datetimeFigureOut">
               <a:rPr lang="en-US" smtClean="0"/>
-              <a:t>11/7/17</a:t>
+              <a:t>12/5/17</a:t>
             </a:fld>
             <a:endParaRPr lang="en-US"/>
           </a:p>
@@ -2969,7 +2969,7 @@
           <a:p>
             <a:fld id="{B122C9D4-D70C-8744-B8EA-410692182F3A}" type="datetimeFigureOut">
               <a:rPr lang="en-US" smtClean="0"/>
-              <a:t>11/7/17</a:t>
+              <a:t>12/5/17</a:t>
             </a:fld>
             <a:endParaRPr lang="en-US"/>
           </a:p>
@@ -33052,7 +33052,7 @@
           <p:nvPr>
             <p:extLst>
               <p:ext uri="{D42A27DB-BD31-4B8C-83A1-F6EECF244321}">
-                <p14:modId xmlns:p14="http://schemas.microsoft.com/office/powerpoint/2010/main" val="2013252518"/>
+                <p14:modId xmlns:p14="http://schemas.microsoft.com/office/powerpoint/2010/main" val="1264365469"/>
               </p:ext>
             </p:extLst>
           </p:nvPr>
@@ -33487,21 +33487,25 @@
                     <a:p>
                       <a:r>
                         <a:rPr lang="en-US" sz="1400" dirty="0" smtClean="0"/>
-                        <a:t>.167+.333</a:t>
-                      </a:r>
-                      <a:endParaRPr lang="en-US" sz="1400" dirty="0"/>
-                    </a:p>
-                  </a:txBody>
-                  <a:tcPr/>
-                </a:tc>
-                <a:tc>
-                  <a:txBody>
-                    <a:bodyPr/>
-                    <a:lstStyle/>
-                    <a:p>
-                      <a:r>
-                        <a:rPr lang="en-US" sz="1400" dirty="0" smtClean="0"/>
-                        <a:t>1.167</a:t>
+                        <a:t>.167+.</a:t>
+                      </a:r>
+                      <a:r>
+                        <a:rPr lang="en-US" sz="1400" dirty="0" smtClean="0"/>
+                        <a:t>333+.222+.444</a:t>
+                      </a:r>
+                      <a:endParaRPr lang="en-US" sz="1400" dirty="0"/>
+                    </a:p>
+                  </a:txBody>
+                  <a:tcPr/>
+                </a:tc>
+                <a:tc>
+                  <a:txBody>
+                    <a:bodyPr/>
+                    <a:lstStyle/>
+                    <a:p>
+                      <a:r>
+                        <a:rPr lang="en-US" sz="1400" dirty="0" smtClean="0"/>
+                        <a:t>1.833</a:t>
                       </a:r>
                       <a:endParaRPr lang="en-US" sz="1400" dirty="0"/>
                     </a:p>
@@ -34417,7 +34421,7 @@
           <p:nvPr>
             <p:extLst>
               <p:ext uri="{D42A27DB-BD31-4B8C-83A1-F6EECF244321}">
-                <p14:modId xmlns:p14="http://schemas.microsoft.com/office/powerpoint/2010/main" val="571059404"/>
+                <p14:modId xmlns:p14="http://schemas.microsoft.com/office/powerpoint/2010/main" val="1970955387"/>
               </p:ext>
             </p:extLst>
           </p:nvPr>
@@ -34852,21 +34856,21 @@
                     <a:p>
                       <a:r>
                         <a:rPr lang="en-US" sz="1400" dirty="0" smtClean="0"/>
-                        <a:t>.5</a:t>
-                      </a:r>
-                      <a:endParaRPr lang="en-US" sz="1400" dirty="0"/>
-                    </a:p>
-                  </a:txBody>
-                  <a:tcPr/>
-                </a:tc>
-                <a:tc>
-                  <a:txBody>
-                    <a:bodyPr/>
-                    <a:lstStyle/>
-                    <a:p>
-                      <a:r>
-                        <a:rPr lang="en-US" sz="1400" dirty="0" smtClean="0"/>
                         <a:t>1.167</a:t>
+                      </a:r>
+                      <a:endParaRPr lang="en-US" sz="1400" dirty="0"/>
+                    </a:p>
+                  </a:txBody>
+                  <a:tcPr/>
+                </a:tc>
+                <a:tc>
+                  <a:txBody>
+                    <a:bodyPr/>
+                    <a:lstStyle/>
+                    <a:p>
+                      <a:r>
+                        <a:rPr lang="en-US" sz="1400" dirty="0" smtClean="0"/>
+                        <a:t>1.833</a:t>
                       </a:r>
                       <a:endParaRPr lang="en-US" sz="1400" dirty="0"/>
                     </a:p>
@@ -34887,7 +34891,7 @@
           <p:nvPr>
             <p:extLst>
               <p:ext uri="{D42A27DB-BD31-4B8C-83A1-F6EECF244321}">
-                <p14:modId xmlns:p14="http://schemas.microsoft.com/office/powerpoint/2010/main" val="1349780877"/>
+                <p14:modId xmlns:p14="http://schemas.microsoft.com/office/powerpoint/2010/main" val="177082912"/>
               </p:ext>
             </p:extLst>
           </p:nvPr>
@@ -35223,21 +35227,21 @@
                     <a:p>
                       <a:r>
                         <a:rPr lang="en-US" sz="1400" dirty="0" smtClean="0"/>
-                        <a:t>.285</a:t>
-                      </a:r>
-                      <a:endParaRPr lang="en-US" sz="1400" dirty="0"/>
-                    </a:p>
-                  </a:txBody>
-                  <a:tcPr/>
-                </a:tc>
-                <a:tc>
-                  <a:txBody>
-                    <a:bodyPr/>
-                    <a:lstStyle/>
-                    <a:p>
-                      <a:r>
-                        <a:rPr lang="en-US" sz="1400" dirty="0" smtClean="0"/>
-                        <a:t>.285</a:t>
+                        <a:t>.182</a:t>
+                      </a:r>
+                      <a:endParaRPr lang="en-US" sz="1400" dirty="0"/>
+                    </a:p>
+                  </a:txBody>
+                  <a:tcPr/>
+                </a:tc>
+                <a:tc>
+                  <a:txBody>
+                    <a:bodyPr/>
+                    <a:lstStyle/>
+                    <a:p>
+                      <a:r>
+                        <a:rPr lang="en-US" sz="1400" dirty="0" smtClean="0"/>
+                        <a:t>.182</a:t>
                       </a:r>
                       <a:endParaRPr lang="en-US" sz="1400" dirty="0"/>
                     </a:p>
@@ -35265,7 +35269,7 @@
                     <a:p>
                       <a:r>
                         <a:rPr lang="en-US" sz="1400" dirty="0" smtClean="0"/>
-                        <a:t>.428</a:t>
+                        <a:t>.636</a:t>
                       </a:r>
                       <a:endParaRPr lang="en-US" sz="1400" dirty="0"/>
                     </a:p>
@@ -39148,15 +39152,7 @@
             </a:r>
             <a:r>
               <a:rPr lang="en-US" dirty="0" smtClean="0"/>
-              <a:t>"); apache </a:t>
-            </a:r>
-            <a:r>
-              <a:rPr lang="en-US" dirty="0" smtClean="0"/>
-              <a:t>project </a:t>
-            </a:r>
-            <a:r>
-              <a:rPr lang="en-US" dirty="0" smtClean="0"/>
-              <a:t>maintained by </a:t>
+              <a:t>"); apache project maintained by </a:t>
             </a:r>
             <a:r>
               <a:rPr lang="en-US" dirty="0" err="1" smtClean="0"/>

</xml_diff>